<commit_message>
add code and ppt for 4-3
</commit_message>
<xml_diff>
--- a/ppt/4.3-使类支持运算符.pptx
+++ b/ppt/4.3-使类支持运算符.pptx
@@ -44,10 +44,10 @@
         <a:solidFill>
           <a:srgbClr val="000000"/>
         </a:solidFill>
-        <a:latin typeface="Arial" panose="02080604020202020204" charset="0"/>
-        <a:ea typeface="Arial" panose="02080604020202020204" charset="0"/>
-        <a:cs typeface="Arial" panose="02080604020202020204" charset="0"/>
-        <a:sym typeface="Arial" panose="02080604020202020204" charset="0"/>
+        <a:latin typeface="Arial" charset="0"/>
+        <a:ea typeface="Arial" charset="0"/>
+        <a:cs typeface="Arial" charset="0"/>
+        <a:sym typeface="Arial" charset="0"/>
       </a:defRPr>
     </a:lvl1pPr>
     <a:lvl2pPr marR="0" lvl="1" algn="l" rtl="0">
@@ -65,10 +65,10 @@
         <a:solidFill>
           <a:srgbClr val="000000"/>
         </a:solidFill>
-        <a:latin typeface="Arial" panose="02080604020202020204" charset="0"/>
-        <a:ea typeface="Arial" panose="02080604020202020204" charset="0"/>
-        <a:cs typeface="Arial" panose="02080604020202020204" charset="0"/>
-        <a:sym typeface="Arial" panose="02080604020202020204" charset="0"/>
+        <a:latin typeface="Arial" charset="0"/>
+        <a:ea typeface="Arial" charset="0"/>
+        <a:cs typeface="Arial" charset="0"/>
+        <a:sym typeface="Arial" charset="0"/>
       </a:defRPr>
     </a:lvl2pPr>
     <a:lvl3pPr marR="0" lvl="2" algn="l" rtl="0">
@@ -86,10 +86,10 @@
         <a:solidFill>
           <a:srgbClr val="000000"/>
         </a:solidFill>
-        <a:latin typeface="Arial" panose="02080604020202020204" charset="0"/>
-        <a:ea typeface="Arial" panose="02080604020202020204" charset="0"/>
-        <a:cs typeface="Arial" panose="02080604020202020204" charset="0"/>
-        <a:sym typeface="Arial" panose="02080604020202020204" charset="0"/>
+        <a:latin typeface="Arial" charset="0"/>
+        <a:ea typeface="Arial" charset="0"/>
+        <a:cs typeface="Arial" charset="0"/>
+        <a:sym typeface="Arial" charset="0"/>
       </a:defRPr>
     </a:lvl3pPr>
     <a:lvl4pPr marR="0" lvl="3" algn="l" rtl="0">
@@ -107,10 +107,10 @@
         <a:solidFill>
           <a:srgbClr val="000000"/>
         </a:solidFill>
-        <a:latin typeface="Arial" panose="02080604020202020204" charset="0"/>
-        <a:ea typeface="Arial" panose="02080604020202020204" charset="0"/>
-        <a:cs typeface="Arial" panose="02080604020202020204" charset="0"/>
-        <a:sym typeface="Arial" panose="02080604020202020204" charset="0"/>
+        <a:latin typeface="Arial" charset="0"/>
+        <a:ea typeface="Arial" charset="0"/>
+        <a:cs typeface="Arial" charset="0"/>
+        <a:sym typeface="Arial" charset="0"/>
       </a:defRPr>
     </a:lvl4pPr>
     <a:lvl5pPr marR="0" lvl="4" algn="l" rtl="0">
@@ -128,10 +128,10 @@
         <a:solidFill>
           <a:srgbClr val="000000"/>
         </a:solidFill>
-        <a:latin typeface="Arial" panose="02080604020202020204" charset="0"/>
-        <a:ea typeface="Arial" panose="02080604020202020204" charset="0"/>
-        <a:cs typeface="Arial" panose="02080604020202020204" charset="0"/>
-        <a:sym typeface="Arial" panose="02080604020202020204" charset="0"/>
+        <a:latin typeface="Arial" charset="0"/>
+        <a:ea typeface="Arial" charset="0"/>
+        <a:cs typeface="Arial" charset="0"/>
+        <a:sym typeface="Arial" charset="0"/>
       </a:defRPr>
     </a:lvl5pPr>
     <a:lvl6pPr marR="0" lvl="5" algn="l" rtl="0">
@@ -149,10 +149,10 @@
         <a:solidFill>
           <a:srgbClr val="000000"/>
         </a:solidFill>
-        <a:latin typeface="Arial" panose="02080604020202020204" charset="0"/>
-        <a:ea typeface="Arial" panose="02080604020202020204" charset="0"/>
-        <a:cs typeface="Arial" panose="02080604020202020204" charset="0"/>
-        <a:sym typeface="Arial" panose="02080604020202020204" charset="0"/>
+        <a:latin typeface="Arial" charset="0"/>
+        <a:ea typeface="Arial" charset="0"/>
+        <a:cs typeface="Arial" charset="0"/>
+        <a:sym typeface="Arial" charset="0"/>
       </a:defRPr>
     </a:lvl6pPr>
     <a:lvl7pPr marR="0" lvl="6" algn="l" rtl="0">
@@ -170,10 +170,10 @@
         <a:solidFill>
           <a:srgbClr val="000000"/>
         </a:solidFill>
-        <a:latin typeface="Arial" panose="02080604020202020204" charset="0"/>
-        <a:ea typeface="Arial" panose="02080604020202020204" charset="0"/>
-        <a:cs typeface="Arial" panose="02080604020202020204" charset="0"/>
-        <a:sym typeface="Arial" panose="02080604020202020204" charset="0"/>
+        <a:latin typeface="Arial" charset="0"/>
+        <a:ea typeface="Arial" charset="0"/>
+        <a:cs typeface="Arial" charset="0"/>
+        <a:sym typeface="Arial" charset="0"/>
       </a:defRPr>
     </a:lvl7pPr>
     <a:lvl8pPr marR="0" lvl="7" algn="l" rtl="0">
@@ -191,10 +191,10 @@
         <a:solidFill>
           <a:srgbClr val="000000"/>
         </a:solidFill>
-        <a:latin typeface="Arial" panose="02080604020202020204" charset="0"/>
-        <a:ea typeface="Arial" panose="02080604020202020204" charset="0"/>
-        <a:cs typeface="Arial" panose="02080604020202020204" charset="0"/>
-        <a:sym typeface="Arial" panose="02080604020202020204" charset="0"/>
+        <a:latin typeface="Arial" charset="0"/>
+        <a:ea typeface="Arial" charset="0"/>
+        <a:cs typeface="Arial" charset="0"/>
+        <a:sym typeface="Arial" charset="0"/>
       </a:defRPr>
     </a:lvl8pPr>
     <a:lvl9pPr marR="0" lvl="8" algn="l" rtl="0">
@@ -212,10 +212,10 @@
         <a:solidFill>
           <a:srgbClr val="000000"/>
         </a:solidFill>
-        <a:latin typeface="Arial" panose="02080604020202020204" charset="0"/>
-        <a:ea typeface="Arial" panose="02080604020202020204" charset="0"/>
-        <a:cs typeface="Arial" panose="02080604020202020204" charset="0"/>
-        <a:sym typeface="Arial" panose="02080604020202020204" charset="0"/>
+        <a:latin typeface="Arial" charset="0"/>
+        <a:ea typeface="Arial" charset="0"/>
+        <a:cs typeface="Arial" charset="0"/>
+        <a:sym typeface="Arial" charset="0"/>
       </a:defRPr>
     </a:lvl9pPr>
   </p:defaultTextStyle>
@@ -227,6 +227,7 @@
   <p:cSld>
     <p:bg>
       <p:bgPr>
+        <a:noFill/>
         <a:effectLst/>
       </p:bgPr>
     </p:bg>
@@ -469,6 +470,7 @@
               <a:rPr lang="en-GB"/>
               <a:t>大家好，在这一节里，我们来介绍利用magic method让类能够支持运算符。</a:t>
             </a:r>
+            <a:endParaRPr lang="en-GB"/>
           </a:p>
         </p:txBody>
       </p:sp>
@@ -568,6 +570,7 @@
               <a:rPr lang="en-GB"/>
               <a:t>有时候，你可能需要让你定义的类进行一些比大小，或者一些基本的运算。如果没有magic method，你将会需要另外定义方法来完成这些功能。而有了magic method的帮助，你将可以使对类的运算得到python基础语法的支持，是一种非常优美的解决办法。</a:t>
             </a:r>
+            <a:endParaRPr lang="en-GB"/>
           </a:p>
         </p:txBody>
       </p:sp>
@@ -667,6 +670,7 @@
               <a:rPr lang="en-GB"/>
               <a:t>我们来通过一个例子来说明一个对象为什么能够支持运算符。在这里我用一段简单的代码来举了个例子。在这里，我们简单的定义了一个简单的字符串，并且判断字符串是否相等，利用了==这个运算符。那么字符串这个类的对象为什么能够支持这个运算符呢，我们利用dir( )这个方法来输出一些字符串对象的属性。由于ppt的篇幅原因，我没有把全部的属性都放在这里，我们需要关注的就是 __eq__ 这个方法，就是因为这个方法，使得字符串的对象能够判断相等。其他的运算符其实也于此类似，如果想让你定义的类支持某个运算符，那么在类里面定义好相应的magic method就可以了。</a:t>
             </a:r>
+            <a:endParaRPr lang="en-GB"/>
           </a:p>
         </p:txBody>
       </p:sp>
@@ -1249,6 +1253,7 @@
             <a:fld id="{00000000-1234-1234-1234-123412341234}" type="slidenum">
               <a:rPr lang="en-GB"/>
             </a:fld>
+            <a:endParaRPr lang="en-GB"/>
           </a:p>
         </p:txBody>
       </p:sp>
@@ -1474,6 +1479,7 @@
             <a:fld id="{00000000-1234-1234-1234-123412341234}" type="slidenum">
               <a:rPr lang="en-GB"/>
             </a:fld>
+            <a:endParaRPr lang="en-GB"/>
           </a:p>
         </p:txBody>
       </p:sp>
@@ -1534,6 +1540,7 @@
             <a:fld id="{00000000-1234-1234-1234-123412341234}" type="slidenum">
               <a:rPr lang="en-GB"/>
             </a:fld>
+            <a:endParaRPr lang="en-GB"/>
           </a:p>
         </p:txBody>
       </p:sp>
@@ -1681,6 +1688,7 @@
             <a:fld id="{00000000-1234-1234-1234-123412341234}" type="slidenum">
               <a:rPr lang="en-GB"/>
             </a:fld>
+            <a:endParaRPr lang="en-GB"/>
           </a:p>
         </p:txBody>
       </p:sp>
@@ -1897,6 +1905,7 @@
             <a:fld id="{00000000-1234-1234-1234-123412341234}" type="slidenum">
               <a:rPr lang="en-GB"/>
             </a:fld>
+            <a:endParaRPr lang="en-GB"/>
           </a:p>
         </p:txBody>
       </p:sp>
@@ -2209,6 +2218,7 @@
             <a:fld id="{00000000-1234-1234-1234-123412341234}" type="slidenum">
               <a:rPr lang="en-GB"/>
             </a:fld>
+            <a:endParaRPr lang="en-GB"/>
           </a:p>
         </p:txBody>
       </p:sp>
@@ -2347,6 +2357,7 @@
             <a:fld id="{00000000-1234-1234-1234-123412341234}" type="slidenum">
               <a:rPr lang="en-GB"/>
             </a:fld>
+            <a:endParaRPr lang="en-GB"/>
           </a:p>
         </p:txBody>
       </p:sp>
@@ -2581,6 +2592,7 @@
             <a:fld id="{00000000-1234-1234-1234-123412341234}" type="slidenum">
               <a:rPr lang="en-GB"/>
             </a:fld>
+            <a:endParaRPr lang="en-GB"/>
           </a:p>
         </p:txBody>
       </p:sp>
@@ -2728,6 +2740,7 @@
             <a:fld id="{00000000-1234-1234-1234-123412341234}" type="slidenum">
               <a:rPr lang="en-GB"/>
             </a:fld>
+            <a:endParaRPr lang="en-GB"/>
           </a:p>
         </p:txBody>
       </p:sp>
@@ -3139,6 +3152,7 @@
             <a:fld id="{00000000-1234-1234-1234-123412341234}" type="slidenum">
               <a:rPr lang="en-GB"/>
             </a:fld>
+            <a:endParaRPr lang="en-GB"/>
           </a:p>
         </p:txBody>
       </p:sp>
@@ -3236,6 +3250,7 @@
             <a:fld id="{00000000-1234-1234-1234-123412341234}" type="slidenum">
               <a:rPr lang="en-GB"/>
             </a:fld>
+            <a:endParaRPr lang="en-GB"/>
           </a:p>
         </p:txBody>
       </p:sp>
@@ -3675,6 +3690,11 @@
                 </a:solidFill>
               </a:rPr>
             </a:fld>
+            <a:endParaRPr lang="en-GB" sz="1000">
+              <a:solidFill>
+                <a:schemeClr val="dk2"/>
+              </a:solidFill>
+            </a:endParaRPr>
           </a:p>
         </p:txBody>
       </p:sp>
@@ -3723,10 +3743,10 @@
           <a:solidFill>
             <a:srgbClr val="000000"/>
           </a:solidFill>
-          <a:latin typeface="Arial" panose="02080604020202020204" charset="0"/>
-          <a:ea typeface="Arial" panose="02080604020202020204" charset="0"/>
-          <a:cs typeface="Arial" panose="02080604020202020204" charset="0"/>
-          <a:sym typeface="Arial" panose="02080604020202020204" charset="0"/>
+          <a:latin typeface="Arial" charset="0"/>
+          <a:ea typeface="Arial" charset="0"/>
+          <a:cs typeface="Arial" charset="0"/>
+          <a:sym typeface="Arial" charset="0"/>
         </a:defRPr>
       </a:lvl1pPr>
     </p:titleStyle>
@@ -3757,10 +3777,10 @@
           <a:solidFill>
             <a:srgbClr val="000000"/>
           </a:solidFill>
-          <a:latin typeface="Arial" panose="02080604020202020204" charset="0"/>
-          <a:ea typeface="Arial" panose="02080604020202020204" charset="0"/>
-          <a:cs typeface="Arial" panose="02080604020202020204" charset="0"/>
-          <a:sym typeface="Arial" panose="02080604020202020204" charset="0"/>
+          <a:latin typeface="Arial" charset="0"/>
+          <a:ea typeface="Arial" charset="0"/>
+          <a:cs typeface="Arial" charset="0"/>
+          <a:sym typeface="Arial" charset="0"/>
         </a:defRPr>
       </a:lvl1pPr>
       <a:lvl2pPr marR="0" lvl="1" algn="l" rtl="0">
@@ -3778,10 +3798,10 @@
           <a:solidFill>
             <a:srgbClr val="000000"/>
           </a:solidFill>
-          <a:latin typeface="Arial" panose="02080604020202020204" charset="0"/>
-          <a:ea typeface="Arial" panose="02080604020202020204" charset="0"/>
-          <a:cs typeface="Arial" panose="02080604020202020204" charset="0"/>
-          <a:sym typeface="Arial" panose="02080604020202020204" charset="0"/>
+          <a:latin typeface="Arial" charset="0"/>
+          <a:ea typeface="Arial" charset="0"/>
+          <a:cs typeface="Arial" charset="0"/>
+          <a:sym typeface="Arial" charset="0"/>
         </a:defRPr>
       </a:lvl2pPr>
       <a:lvl3pPr marR="0" lvl="2" algn="l" rtl="0">
@@ -3799,10 +3819,10 @@
           <a:solidFill>
             <a:srgbClr val="000000"/>
           </a:solidFill>
-          <a:latin typeface="Arial" panose="02080604020202020204" charset="0"/>
-          <a:ea typeface="Arial" panose="02080604020202020204" charset="0"/>
-          <a:cs typeface="Arial" panose="02080604020202020204" charset="0"/>
-          <a:sym typeface="Arial" panose="02080604020202020204" charset="0"/>
+          <a:latin typeface="Arial" charset="0"/>
+          <a:ea typeface="Arial" charset="0"/>
+          <a:cs typeface="Arial" charset="0"/>
+          <a:sym typeface="Arial" charset="0"/>
         </a:defRPr>
       </a:lvl3pPr>
       <a:lvl4pPr marR="0" lvl="3" algn="l" rtl="0">
@@ -3820,10 +3840,10 @@
           <a:solidFill>
             <a:srgbClr val="000000"/>
           </a:solidFill>
-          <a:latin typeface="Arial" panose="02080604020202020204" charset="0"/>
-          <a:ea typeface="Arial" panose="02080604020202020204" charset="0"/>
-          <a:cs typeface="Arial" panose="02080604020202020204" charset="0"/>
-          <a:sym typeface="Arial" panose="02080604020202020204" charset="0"/>
+          <a:latin typeface="Arial" charset="0"/>
+          <a:ea typeface="Arial" charset="0"/>
+          <a:cs typeface="Arial" charset="0"/>
+          <a:sym typeface="Arial" charset="0"/>
         </a:defRPr>
       </a:lvl4pPr>
       <a:lvl5pPr marR="0" lvl="4" algn="l" rtl="0">
@@ -3841,10 +3861,10 @@
           <a:solidFill>
             <a:srgbClr val="000000"/>
           </a:solidFill>
-          <a:latin typeface="Arial" panose="02080604020202020204" charset="0"/>
-          <a:ea typeface="Arial" panose="02080604020202020204" charset="0"/>
-          <a:cs typeface="Arial" panose="02080604020202020204" charset="0"/>
-          <a:sym typeface="Arial" panose="02080604020202020204" charset="0"/>
+          <a:latin typeface="Arial" charset="0"/>
+          <a:ea typeface="Arial" charset="0"/>
+          <a:cs typeface="Arial" charset="0"/>
+          <a:sym typeface="Arial" charset="0"/>
         </a:defRPr>
       </a:lvl5pPr>
       <a:lvl6pPr marR="0" lvl="5" algn="l" rtl="0">
@@ -3862,10 +3882,10 @@
           <a:solidFill>
             <a:srgbClr val="000000"/>
           </a:solidFill>
-          <a:latin typeface="Arial" panose="02080604020202020204" charset="0"/>
-          <a:ea typeface="Arial" panose="02080604020202020204" charset="0"/>
-          <a:cs typeface="Arial" panose="02080604020202020204" charset="0"/>
-          <a:sym typeface="Arial" panose="02080604020202020204" charset="0"/>
+          <a:latin typeface="Arial" charset="0"/>
+          <a:ea typeface="Arial" charset="0"/>
+          <a:cs typeface="Arial" charset="0"/>
+          <a:sym typeface="Arial" charset="0"/>
         </a:defRPr>
       </a:lvl6pPr>
       <a:lvl7pPr marR="0" lvl="6" algn="l" rtl="0">
@@ -3883,10 +3903,10 @@
           <a:solidFill>
             <a:srgbClr val="000000"/>
           </a:solidFill>
-          <a:latin typeface="Arial" panose="02080604020202020204" charset="0"/>
-          <a:ea typeface="Arial" panose="02080604020202020204" charset="0"/>
-          <a:cs typeface="Arial" panose="02080604020202020204" charset="0"/>
-          <a:sym typeface="Arial" panose="02080604020202020204" charset="0"/>
+          <a:latin typeface="Arial" charset="0"/>
+          <a:ea typeface="Arial" charset="0"/>
+          <a:cs typeface="Arial" charset="0"/>
+          <a:sym typeface="Arial" charset="0"/>
         </a:defRPr>
       </a:lvl7pPr>
       <a:lvl8pPr marR="0" lvl="7" algn="l" rtl="0">
@@ -3904,10 +3924,10 @@
           <a:solidFill>
             <a:srgbClr val="000000"/>
           </a:solidFill>
-          <a:latin typeface="Arial" panose="02080604020202020204" charset="0"/>
-          <a:ea typeface="Arial" panose="02080604020202020204" charset="0"/>
-          <a:cs typeface="Arial" panose="02080604020202020204" charset="0"/>
-          <a:sym typeface="Arial" panose="02080604020202020204" charset="0"/>
+          <a:latin typeface="Arial" charset="0"/>
+          <a:ea typeface="Arial" charset="0"/>
+          <a:cs typeface="Arial" charset="0"/>
+          <a:sym typeface="Arial" charset="0"/>
         </a:defRPr>
       </a:lvl8pPr>
       <a:lvl9pPr marR="0" lvl="8" algn="l" rtl="0">
@@ -3925,10 +3945,10 @@
           <a:solidFill>
             <a:srgbClr val="000000"/>
           </a:solidFill>
-          <a:latin typeface="Arial" panose="02080604020202020204" charset="0"/>
-          <a:ea typeface="Arial" panose="02080604020202020204" charset="0"/>
-          <a:cs typeface="Arial" panose="02080604020202020204" charset="0"/>
-          <a:sym typeface="Arial" panose="02080604020202020204" charset="0"/>
+          <a:latin typeface="Arial" charset="0"/>
+          <a:ea typeface="Arial" charset="0"/>
+          <a:cs typeface="Arial" charset="0"/>
+          <a:sym typeface="Arial" charset="0"/>
         </a:defRPr>
       </a:lvl9pPr>
     </p:bodyStyle>
@@ -3959,10 +3979,10 @@
           <a:solidFill>
             <a:srgbClr val="000000"/>
           </a:solidFill>
-          <a:latin typeface="Arial" panose="02080604020202020204" charset="0"/>
-          <a:ea typeface="Arial" panose="02080604020202020204" charset="0"/>
-          <a:cs typeface="Arial" panose="02080604020202020204" charset="0"/>
-          <a:sym typeface="Arial" panose="02080604020202020204" charset="0"/>
+          <a:latin typeface="Arial" charset="0"/>
+          <a:ea typeface="Arial" charset="0"/>
+          <a:cs typeface="Arial" charset="0"/>
+          <a:sym typeface="Arial" charset="0"/>
         </a:defRPr>
       </a:lvl1pPr>
       <a:lvl2pPr marR="0" lvl="1" algn="l" rtl="0">
@@ -3980,10 +4000,10 @@
           <a:solidFill>
             <a:srgbClr val="000000"/>
           </a:solidFill>
-          <a:latin typeface="Arial" panose="02080604020202020204" charset="0"/>
-          <a:ea typeface="Arial" panose="02080604020202020204" charset="0"/>
-          <a:cs typeface="Arial" panose="02080604020202020204" charset="0"/>
-          <a:sym typeface="Arial" panose="02080604020202020204" charset="0"/>
+          <a:latin typeface="Arial" charset="0"/>
+          <a:ea typeface="Arial" charset="0"/>
+          <a:cs typeface="Arial" charset="0"/>
+          <a:sym typeface="Arial" charset="0"/>
         </a:defRPr>
       </a:lvl2pPr>
       <a:lvl3pPr marR="0" lvl="2" algn="l" rtl="0">
@@ -4001,10 +4021,10 @@
           <a:solidFill>
             <a:srgbClr val="000000"/>
           </a:solidFill>
-          <a:latin typeface="Arial" panose="02080604020202020204" charset="0"/>
-          <a:ea typeface="Arial" panose="02080604020202020204" charset="0"/>
-          <a:cs typeface="Arial" panose="02080604020202020204" charset="0"/>
-          <a:sym typeface="Arial" panose="02080604020202020204" charset="0"/>
+          <a:latin typeface="Arial" charset="0"/>
+          <a:ea typeface="Arial" charset="0"/>
+          <a:cs typeface="Arial" charset="0"/>
+          <a:sym typeface="Arial" charset="0"/>
         </a:defRPr>
       </a:lvl3pPr>
       <a:lvl4pPr marR="0" lvl="3" algn="l" rtl="0">
@@ -4022,10 +4042,10 @@
           <a:solidFill>
             <a:srgbClr val="000000"/>
           </a:solidFill>
-          <a:latin typeface="Arial" panose="02080604020202020204" charset="0"/>
-          <a:ea typeface="Arial" panose="02080604020202020204" charset="0"/>
-          <a:cs typeface="Arial" panose="02080604020202020204" charset="0"/>
-          <a:sym typeface="Arial" panose="02080604020202020204" charset="0"/>
+          <a:latin typeface="Arial" charset="0"/>
+          <a:ea typeface="Arial" charset="0"/>
+          <a:cs typeface="Arial" charset="0"/>
+          <a:sym typeface="Arial" charset="0"/>
         </a:defRPr>
       </a:lvl4pPr>
       <a:lvl5pPr marR="0" lvl="4" algn="l" rtl="0">
@@ -4043,10 +4063,10 @@
           <a:solidFill>
             <a:srgbClr val="000000"/>
           </a:solidFill>
-          <a:latin typeface="Arial" panose="02080604020202020204" charset="0"/>
-          <a:ea typeface="Arial" panose="02080604020202020204" charset="0"/>
-          <a:cs typeface="Arial" panose="02080604020202020204" charset="0"/>
-          <a:sym typeface="Arial" panose="02080604020202020204" charset="0"/>
+          <a:latin typeface="Arial" charset="0"/>
+          <a:ea typeface="Arial" charset="0"/>
+          <a:cs typeface="Arial" charset="0"/>
+          <a:sym typeface="Arial" charset="0"/>
         </a:defRPr>
       </a:lvl5pPr>
       <a:lvl6pPr marR="0" lvl="5" algn="l" rtl="0">
@@ -4064,10 +4084,10 @@
           <a:solidFill>
             <a:srgbClr val="000000"/>
           </a:solidFill>
-          <a:latin typeface="Arial" panose="02080604020202020204" charset="0"/>
-          <a:ea typeface="Arial" panose="02080604020202020204" charset="0"/>
-          <a:cs typeface="Arial" panose="02080604020202020204" charset="0"/>
-          <a:sym typeface="Arial" panose="02080604020202020204" charset="0"/>
+          <a:latin typeface="Arial" charset="0"/>
+          <a:ea typeface="Arial" charset="0"/>
+          <a:cs typeface="Arial" charset="0"/>
+          <a:sym typeface="Arial" charset="0"/>
         </a:defRPr>
       </a:lvl6pPr>
       <a:lvl7pPr marR="0" lvl="6" algn="l" rtl="0">
@@ -4085,10 +4105,10 @@
           <a:solidFill>
             <a:srgbClr val="000000"/>
           </a:solidFill>
-          <a:latin typeface="Arial" panose="02080604020202020204" charset="0"/>
-          <a:ea typeface="Arial" panose="02080604020202020204" charset="0"/>
-          <a:cs typeface="Arial" panose="02080604020202020204" charset="0"/>
-          <a:sym typeface="Arial" panose="02080604020202020204" charset="0"/>
+          <a:latin typeface="Arial" charset="0"/>
+          <a:ea typeface="Arial" charset="0"/>
+          <a:cs typeface="Arial" charset="0"/>
+          <a:sym typeface="Arial" charset="0"/>
         </a:defRPr>
       </a:lvl7pPr>
       <a:lvl8pPr marR="0" lvl="7" algn="l" rtl="0">
@@ -4106,10 +4126,10 @@
           <a:solidFill>
             <a:srgbClr val="000000"/>
           </a:solidFill>
-          <a:latin typeface="Arial" panose="02080604020202020204" charset="0"/>
-          <a:ea typeface="Arial" panose="02080604020202020204" charset="0"/>
-          <a:cs typeface="Arial" panose="02080604020202020204" charset="0"/>
-          <a:sym typeface="Arial" panose="02080604020202020204" charset="0"/>
+          <a:latin typeface="Arial" charset="0"/>
+          <a:ea typeface="Arial" charset="0"/>
+          <a:cs typeface="Arial" charset="0"/>
+          <a:sym typeface="Arial" charset="0"/>
         </a:defRPr>
       </a:lvl8pPr>
       <a:lvl9pPr marR="0" lvl="8" algn="l" rtl="0">
@@ -4127,10 +4147,10 @@
           <a:solidFill>
             <a:srgbClr val="000000"/>
           </a:solidFill>
-          <a:latin typeface="Arial" panose="02080604020202020204" charset="0"/>
-          <a:ea typeface="Arial" panose="02080604020202020204" charset="0"/>
-          <a:cs typeface="Arial" panose="02080604020202020204" charset="0"/>
-          <a:sym typeface="Arial" panose="02080604020202020204" charset="0"/>
+          <a:latin typeface="Arial" charset="0"/>
+          <a:ea typeface="Arial" charset="0"/>
+          <a:cs typeface="Arial" charset="0"/>
+          <a:sym typeface="Arial" charset="0"/>
         </a:defRPr>
       </a:lvl9pPr>
     </p:otherStyle>
@@ -4340,27 +4360,40 @@
               <a:spcBef>
                 <a:spcPts val="0"/>
               </a:spcBef>
-              <a:buFont typeface="Arial" panose="02080604020202020204" charset="0"/>
+              <a:buFont typeface="Arial" charset="0"/>
               <a:buChar char="•"/>
             </a:pPr>
             <a:r>
-              <a:rPr lang="en-GB"/>
+              <a:rPr lang="en-GB">
+                <a:latin typeface="微软雅黑" charset="0"/>
+                <a:ea typeface="微软雅黑" charset="0"/>
+              </a:rPr>
               <a:t>优雅</a:t>
             </a:r>
-            <a:endParaRPr lang="en-GB"/>
+            <a:endParaRPr lang="en-GB">
+              <a:latin typeface="微软雅黑" charset="0"/>
+              <a:ea typeface="微软雅黑" charset="0"/>
+            </a:endParaRPr>
           </a:p>
           <a:p>
             <a:pPr marL="514350" lvl="0" indent="-285750" rtl="0">
               <a:spcBef>
                 <a:spcPts val="0"/>
               </a:spcBef>
-              <a:buFont typeface="Arial" panose="02080604020202020204" charset="0"/>
+              <a:buFont typeface="Arial" charset="0"/>
               <a:buChar char="•"/>
             </a:pPr>
             <a:r>
-              <a:rPr lang="en-GB"/>
+              <a:rPr lang="en-GB">
+                <a:latin typeface="微软雅黑" charset="0"/>
+                <a:ea typeface="微软雅黑" charset="0"/>
+              </a:rPr>
               <a:t>被Python的标准语法支持</a:t>
             </a:r>
+            <a:endParaRPr lang="en-GB">
+              <a:latin typeface="微软雅黑" charset="0"/>
+              <a:ea typeface="微软雅黑" charset="0"/>
+            </a:endParaRPr>
           </a:p>
         </p:txBody>
       </p:sp>
@@ -4514,6 +4547,13 @@
               </a:rPr>
               <a:t>举个栗子</a:t>
             </a:r>
+            <a:endParaRPr lang="en-GB" sz="2200" b="1" dirty="0" err="1">
+              <a:solidFill>
+                <a:srgbClr val="C9394A"/>
+              </a:solidFill>
+              <a:latin typeface="微软雅黑" charset="0"/>
+              <a:ea typeface="微软雅黑" charset="0"/>
+            </a:endParaRPr>
           </a:p>
         </p:txBody>
       </p:sp>
@@ -4554,7 +4594,7 @@
                 <a:schemeClr val="dk1"/>
               </a:buClr>
               <a:buSzPct val="73000"/>
-              <a:buFont typeface="Arial" panose="02080604020202020204" charset="0"/>
+              <a:buFont typeface="Arial" charset="0"/>
               <a:buNone/>
             </a:pPr>
             <a:r>
@@ -5191,6 +5231,13 @@
               </a:rPr>
               <a:t>比较运算符</a:t>
             </a:r>
+            <a:endParaRPr lang="en-GB" sz="2200" b="1" dirty="0" err="1">
+              <a:solidFill>
+                <a:srgbClr val="C9394A"/>
+              </a:solidFill>
+              <a:latin typeface="微软雅黑" charset="0"/>
+              <a:ea typeface="微软雅黑" charset="0"/>
+            </a:endParaRPr>
           </a:p>
         </p:txBody>
       </p:sp>
@@ -5262,6 +5309,7 @@
               <a:rPr lang="en-GB"/>
               <a:t>__gt__(self, other)</a:t>
             </a:r>
+            <a:endParaRPr lang="en-GB"/>
           </a:p>
         </p:txBody>
       </p:sp>
@@ -5493,6 +5541,7 @@
               <a:rPr lang="en-GB"/>
               <a:t>__div__(self, other)</a:t>
             </a:r>
+            <a:endParaRPr lang="en-GB"/>
           </a:p>
         </p:txBody>
       </p:sp>

</xml_diff>

<commit_message>
add ppt and code
</commit_message>
<xml_diff>
--- a/ppt/4.3-使类支持运算符.pptx
+++ b/ppt/4.3-使类支持运算符.pptx
@@ -4212,7 +4212,27 @@
                 <a:latin typeface="微软雅黑" charset="0"/>
                 <a:ea typeface="微软雅黑" charset="0"/>
               </a:rPr>
-              <a:t>定制类对运算符的支持</a:t>
+              <a:t>类</a:t>
+            </a:r>
+            <a:r>
+              <a:rPr lang="zh-CN" altLang="en-GB" sz="3000" b="1" dirty="0" err="1">
+                <a:solidFill>
+                  <a:srgbClr val="C9394A"/>
+                </a:solidFill>
+                <a:latin typeface="微软雅黑" charset="0"/>
+                <a:ea typeface="微软雅黑" charset="0"/>
+              </a:rPr>
+              <a:t>与</a:t>
+            </a:r>
+            <a:r>
+              <a:rPr lang="en-GB" sz="3000" b="1" dirty="0" err="1">
+                <a:solidFill>
+                  <a:srgbClr val="C9394A"/>
+                </a:solidFill>
+                <a:latin typeface="微软雅黑" charset="0"/>
+                <a:ea typeface="微软雅黑" charset="0"/>
+              </a:rPr>
+              <a:t>运算符</a:t>
             </a:r>
             <a:endParaRPr lang="en-GB" sz="3000" b="1" dirty="0" err="1">
               <a:solidFill>

</xml_diff>